<commit_message>
adds complete game intro scene
</commit_message>
<xml_diff>
--- a/resources/Presentation1.pptx
+++ b/resources/Presentation1.pptx
@@ -7,6 +7,7 @@
   <p:sldIdLst>
     <p:sldId id="256" r:id="rId2"/>
     <p:sldId id="257" r:id="rId3"/>
+    <p:sldId id="258" r:id="rId4"/>
   </p:sldIdLst>
   <p:sldSz cx="9144000" cy="6858000" type="screen4x3"/>
   <p:notesSz cx="6858000" cy="9144000"/>
@@ -289,7 +290,7 @@
           <a:p>
             <a:fld id="{52F25E00-0E50-1E46-B438-41C2AF5E2D41}" type="datetimeFigureOut">
               <a:rPr lang="en-US" smtClean="0"/>
-              <a:t>5/07/18</a:t>
+              <a:t>7/07/18</a:t>
             </a:fld>
             <a:endParaRPr lang="en-US"/>
           </a:p>
@@ -459,7 +460,7 @@
           <a:p>
             <a:fld id="{52F25E00-0E50-1E46-B438-41C2AF5E2D41}" type="datetimeFigureOut">
               <a:rPr lang="en-US" smtClean="0"/>
-              <a:t>5/07/18</a:t>
+              <a:t>7/07/18</a:t>
             </a:fld>
             <a:endParaRPr lang="en-US"/>
           </a:p>
@@ -639,7 +640,7 @@
           <a:p>
             <a:fld id="{52F25E00-0E50-1E46-B438-41C2AF5E2D41}" type="datetimeFigureOut">
               <a:rPr lang="en-US" smtClean="0"/>
-              <a:t>5/07/18</a:t>
+              <a:t>7/07/18</a:t>
             </a:fld>
             <a:endParaRPr lang="en-US"/>
           </a:p>
@@ -809,7 +810,7 @@
           <a:p>
             <a:fld id="{52F25E00-0E50-1E46-B438-41C2AF5E2D41}" type="datetimeFigureOut">
               <a:rPr lang="en-US" smtClean="0"/>
-              <a:t>5/07/18</a:t>
+              <a:t>7/07/18</a:t>
             </a:fld>
             <a:endParaRPr lang="en-US"/>
           </a:p>
@@ -1055,7 +1056,7 @@
           <a:p>
             <a:fld id="{52F25E00-0E50-1E46-B438-41C2AF5E2D41}" type="datetimeFigureOut">
               <a:rPr lang="en-US" smtClean="0"/>
-              <a:t>5/07/18</a:t>
+              <a:t>7/07/18</a:t>
             </a:fld>
             <a:endParaRPr lang="en-US"/>
           </a:p>
@@ -1343,7 +1344,7 @@
           <a:p>
             <a:fld id="{52F25E00-0E50-1E46-B438-41C2AF5E2D41}" type="datetimeFigureOut">
               <a:rPr lang="en-US" smtClean="0"/>
-              <a:t>5/07/18</a:t>
+              <a:t>7/07/18</a:t>
             </a:fld>
             <a:endParaRPr lang="en-US"/>
           </a:p>
@@ -1765,7 +1766,7 @@
           <a:p>
             <a:fld id="{52F25E00-0E50-1E46-B438-41C2AF5E2D41}" type="datetimeFigureOut">
               <a:rPr lang="en-US" smtClean="0"/>
-              <a:t>5/07/18</a:t>
+              <a:t>7/07/18</a:t>
             </a:fld>
             <a:endParaRPr lang="en-US"/>
           </a:p>
@@ -1883,7 +1884,7 @@
           <a:p>
             <a:fld id="{52F25E00-0E50-1E46-B438-41C2AF5E2D41}" type="datetimeFigureOut">
               <a:rPr lang="en-US" smtClean="0"/>
-              <a:t>5/07/18</a:t>
+              <a:t>7/07/18</a:t>
             </a:fld>
             <a:endParaRPr lang="en-US"/>
           </a:p>
@@ -1978,7 +1979,7 @@
           <a:p>
             <a:fld id="{52F25E00-0E50-1E46-B438-41C2AF5E2D41}" type="datetimeFigureOut">
               <a:rPr lang="en-US" smtClean="0"/>
-              <a:t>5/07/18</a:t>
+              <a:t>7/07/18</a:t>
             </a:fld>
             <a:endParaRPr lang="en-US"/>
           </a:p>
@@ -2255,7 +2256,7 @@
           <a:p>
             <a:fld id="{52F25E00-0E50-1E46-B438-41C2AF5E2D41}" type="datetimeFigureOut">
               <a:rPr lang="en-US" smtClean="0"/>
-              <a:t>5/07/18</a:t>
+              <a:t>7/07/18</a:t>
             </a:fld>
             <a:endParaRPr lang="en-US"/>
           </a:p>
@@ -2508,7 +2509,7 @@
           <a:p>
             <a:fld id="{52F25E00-0E50-1E46-B438-41C2AF5E2D41}" type="datetimeFigureOut">
               <a:rPr lang="en-US" smtClean="0"/>
-              <a:t>5/07/18</a:t>
+              <a:t>7/07/18</a:t>
             </a:fld>
             <a:endParaRPr lang="en-US"/>
           </a:p>
@@ -2721,7 +2722,7 @@
           <a:p>
             <a:fld id="{52F25E00-0E50-1E46-B438-41C2AF5E2D41}" type="datetimeFigureOut">
               <a:rPr lang="en-US" smtClean="0"/>
-              <a:t>5/07/18</a:t>
+              <a:t>7/07/18</a:t>
             </a:fld>
             <a:endParaRPr lang="en-US"/>
           </a:p>
@@ -3096,399 +3097,414 @@
           <a:chExt cx="0" cy="0"/>
         </a:xfrm>
       </p:grpSpPr>
-      <p:sp>
-        <p:nvSpPr>
-          <p:cNvPr id="5" name="Trapezoid 4"/>
-          <p:cNvSpPr/>
+      <p:grpSp>
+        <p:nvGrpSpPr>
+          <p:cNvPr id="2" name="Group 1"/>
+          <p:cNvGrpSpPr/>
           <p:nvPr/>
-        </p:nvSpPr>
-        <p:spPr>
+        </p:nvGrpSpPr>
+        <p:grpSpPr>
           <a:xfrm>
-            <a:off x="3888637" y="2857868"/>
-            <a:ext cx="1641230" cy="1584763"/>
+            <a:off x="2499145" y="1720001"/>
+            <a:ext cx="4414341" cy="3698038"/>
+            <a:chOff x="2499145" y="1720001"/>
+            <a:chExt cx="4414341" cy="3698038"/>
           </a:xfrm>
-          <a:prstGeom prst="trapezoid">
-            <a:avLst/>
-          </a:prstGeom>
-          <a:solidFill>
-            <a:schemeClr val="accent6">
-              <a:lumMod val="60000"/>
-              <a:lumOff val="40000"/>
-            </a:schemeClr>
-          </a:solidFill>
-          <a:ln>
+        </p:grpSpPr>
+        <p:sp>
+          <p:nvSpPr>
+            <p:cNvPr id="5" name="Trapezoid 4"/>
+            <p:cNvSpPr/>
+            <p:nvPr/>
+          </p:nvSpPr>
+          <p:spPr>
+            <a:xfrm>
+              <a:off x="3888637" y="2857868"/>
+              <a:ext cx="1641230" cy="1584763"/>
+            </a:xfrm>
+            <a:prstGeom prst="trapezoid">
+              <a:avLst/>
+            </a:prstGeom>
+            <a:solidFill>
+              <a:schemeClr val="accent6">
+                <a:lumMod val="60000"/>
+                <a:lumOff val="40000"/>
+              </a:schemeClr>
+            </a:solidFill>
+            <a:ln>
+              <a:solidFill>
+                <a:schemeClr val="tx1"/>
+              </a:solidFill>
+            </a:ln>
+            <a:effectLst/>
+          </p:spPr>
+          <p:style>
+            <a:lnRef idx="1">
+              <a:schemeClr val="accent1"/>
+            </a:lnRef>
+            <a:fillRef idx="3">
+              <a:schemeClr val="accent1"/>
+            </a:fillRef>
+            <a:effectRef idx="2">
+              <a:schemeClr val="accent1"/>
+            </a:effectRef>
+            <a:fontRef idx="minor">
+              <a:schemeClr val="lt1"/>
+            </a:fontRef>
+          </p:style>
+          <p:txBody>
+            <a:bodyPr rtlCol="0" anchor="ctr"/>
+            <a:lstStyle/>
+            <a:p>
+              <a:pPr algn="ctr"/>
+              <a:endParaRPr lang="en-US"/>
+            </a:p>
+          </p:txBody>
+        </p:sp>
+        <p:sp>
+          <p:nvSpPr>
+            <p:cNvPr id="4" name="Hexagon 3"/>
+            <p:cNvSpPr/>
+            <p:nvPr/>
+          </p:nvSpPr>
+          <p:spPr>
+            <a:xfrm>
+              <a:off x="2499145" y="4314365"/>
+              <a:ext cx="4414341" cy="1103674"/>
+            </a:xfrm>
+            <a:prstGeom prst="hexagon">
+              <a:avLst/>
+            </a:prstGeom>
+            <a:solidFill>
+              <a:schemeClr val="accent2">
+                <a:lumMod val="60000"/>
+                <a:lumOff val="40000"/>
+              </a:schemeClr>
+            </a:solidFill>
+            <a:ln>
+              <a:solidFill>
+                <a:schemeClr val="tx1"/>
+              </a:solidFill>
+            </a:ln>
+            <a:effectLst/>
+          </p:spPr>
+          <p:style>
+            <a:lnRef idx="1">
+              <a:schemeClr val="accent1"/>
+            </a:lnRef>
+            <a:fillRef idx="3">
+              <a:schemeClr val="accent1"/>
+            </a:fillRef>
+            <a:effectRef idx="2">
+              <a:schemeClr val="accent1"/>
+            </a:effectRef>
+            <a:fontRef idx="minor">
+              <a:schemeClr val="lt1"/>
+            </a:fontRef>
+          </p:style>
+          <p:txBody>
+            <a:bodyPr rtlCol="0" anchor="ctr"/>
+            <a:lstStyle/>
+            <a:p>
+              <a:pPr algn="ctr"/>
+              <a:endParaRPr lang="en-US"/>
+            </a:p>
+          </p:txBody>
+        </p:sp>
+        <p:sp>
+          <p:nvSpPr>
+            <p:cNvPr id="6" name="Snip Same Side Corner Rectangle 5"/>
+            <p:cNvSpPr/>
+            <p:nvPr/>
+          </p:nvSpPr>
+          <p:spPr>
+            <a:xfrm>
+              <a:off x="3888637" y="1720001"/>
+              <a:ext cx="1641230" cy="1358369"/>
+            </a:xfrm>
+            <a:prstGeom prst="snip2SameRect">
+              <a:avLst/>
+            </a:prstGeom>
+            <a:solidFill>
+              <a:schemeClr val="bg1">
+                <a:lumMod val="95000"/>
+              </a:schemeClr>
+            </a:solidFill>
+            <a:ln>
+              <a:solidFill>
+                <a:schemeClr val="tx1"/>
+              </a:solidFill>
+            </a:ln>
+            <a:effectLst/>
+          </p:spPr>
+          <p:style>
+            <a:lnRef idx="1">
+              <a:schemeClr val="accent1"/>
+            </a:lnRef>
+            <a:fillRef idx="3">
+              <a:schemeClr val="accent1"/>
+            </a:fillRef>
+            <a:effectRef idx="2">
+              <a:schemeClr val="accent1"/>
+            </a:effectRef>
+            <a:fontRef idx="minor">
+              <a:schemeClr val="lt1"/>
+            </a:fontRef>
+          </p:style>
+          <p:txBody>
+            <a:bodyPr rtlCol="0" anchor="ctr"/>
+            <a:lstStyle/>
+            <a:p>
+              <a:pPr algn="ctr"/>
+              <a:endParaRPr lang="en-US"/>
+            </a:p>
+          </p:txBody>
+        </p:sp>
+        <p:sp>
+          <p:nvSpPr>
+            <p:cNvPr id="13" name="Freeform 12"/>
+            <p:cNvSpPr/>
+            <p:nvPr/>
+          </p:nvSpPr>
+          <p:spPr>
+            <a:xfrm>
+              <a:off x="4122001" y="2654249"/>
+              <a:ext cx="1160177" cy="282992"/>
+            </a:xfrm>
+            <a:custGeom>
+              <a:avLst/>
+              <a:gdLst>
+                <a:gd name="connsiteX0" fmla="*/ 0 w 2116768"/>
+                <a:gd name="connsiteY0" fmla="*/ 0 h 529266"/>
+                <a:gd name="connsiteX1" fmla="*/ 1076024 w 2116768"/>
+                <a:gd name="connsiteY1" fmla="*/ 529235 h 529266"/>
+                <a:gd name="connsiteX2" fmla="*/ 2116768 w 2116768"/>
+                <a:gd name="connsiteY2" fmla="*/ 17641 h 529266"/>
+              </a:gdLst>
+              <a:ahLst/>
+              <a:cxnLst>
+                <a:cxn ang="0">
+                  <a:pos x="connsiteX0" y="connsiteY0"/>
+                </a:cxn>
+                <a:cxn ang="0">
+                  <a:pos x="connsiteX1" y="connsiteY1"/>
+                </a:cxn>
+                <a:cxn ang="0">
+                  <a:pos x="connsiteX2" y="connsiteY2"/>
+                </a:cxn>
+              </a:cxnLst>
+              <a:rect l="l" t="t" r="r" b="b"/>
+              <a:pathLst>
+                <a:path w="2116768" h="529266">
+                  <a:moveTo>
+                    <a:pt x="0" y="0"/>
+                  </a:moveTo>
+                  <a:cubicBezTo>
+                    <a:pt x="361614" y="263147"/>
+                    <a:pt x="723229" y="526295"/>
+                    <a:pt x="1076024" y="529235"/>
+                  </a:cubicBezTo>
+                  <a:cubicBezTo>
+                    <a:pt x="1428819" y="532175"/>
+                    <a:pt x="1925671" y="332242"/>
+                    <a:pt x="2116768" y="17641"/>
+                  </a:cubicBezTo>
+                </a:path>
+              </a:pathLst>
+            </a:custGeom>
+            <a:ln w="38100" cmpd="sng">
+              <a:solidFill>
+                <a:srgbClr val="000000"/>
+              </a:solidFill>
+            </a:ln>
+            <a:effectLst/>
+          </p:spPr>
+          <p:style>
+            <a:lnRef idx="2">
+              <a:schemeClr val="accent1"/>
+            </a:lnRef>
+            <a:fillRef idx="0">
+              <a:schemeClr val="accent1"/>
+            </a:fillRef>
+            <a:effectRef idx="1">
+              <a:schemeClr val="accent1"/>
+            </a:effectRef>
+            <a:fontRef idx="minor">
+              <a:schemeClr val="tx1"/>
+            </a:fontRef>
+          </p:style>
+          <p:txBody>
+            <a:bodyPr rtlCol="0" anchor="ctr"/>
+            <a:lstStyle/>
+            <a:p>
+              <a:pPr algn="ctr"/>
+              <a:endParaRPr lang="en-US"/>
+            </a:p>
+          </p:txBody>
+        </p:sp>
+        <p:sp>
+          <p:nvSpPr>
+            <p:cNvPr id="14" name="Oval 13"/>
+            <p:cNvSpPr/>
+            <p:nvPr/>
+          </p:nvSpPr>
+          <p:spPr>
+            <a:xfrm>
+              <a:off x="4225815" y="2108128"/>
+              <a:ext cx="264596" cy="264596"/>
+            </a:xfrm>
+            <a:prstGeom prst="ellipse">
+              <a:avLst/>
+            </a:prstGeom>
             <a:solidFill>
               <a:schemeClr val="tx1"/>
             </a:solidFill>
-          </a:ln>
-          <a:effectLst/>
-        </p:spPr>
-        <p:style>
-          <a:lnRef idx="1">
-            <a:schemeClr val="accent1"/>
-          </a:lnRef>
-          <a:fillRef idx="3">
-            <a:schemeClr val="accent1"/>
-          </a:fillRef>
-          <a:effectRef idx="2">
-            <a:schemeClr val="accent1"/>
-          </a:effectRef>
-          <a:fontRef idx="minor">
-            <a:schemeClr val="lt1"/>
-          </a:fontRef>
-        </p:style>
-        <p:txBody>
-          <a:bodyPr rtlCol="0" anchor="ctr"/>
-          <a:lstStyle/>
-          <a:p>
-            <a:pPr algn="ctr"/>
-            <a:endParaRPr lang="en-US"/>
-          </a:p>
-        </p:txBody>
-      </p:sp>
-      <p:sp>
-        <p:nvSpPr>
-          <p:cNvPr id="4" name="Hexagon 3"/>
-          <p:cNvSpPr/>
-          <p:nvPr/>
-        </p:nvSpPr>
-        <p:spPr>
-          <a:xfrm>
-            <a:off x="2499145" y="4314365"/>
-            <a:ext cx="4414341" cy="1103674"/>
-          </a:xfrm>
-          <a:prstGeom prst="hexagon">
-            <a:avLst/>
-          </a:prstGeom>
-          <a:solidFill>
-            <a:schemeClr val="accent2">
-              <a:lumMod val="60000"/>
-              <a:lumOff val="40000"/>
-            </a:schemeClr>
-          </a:solidFill>
-          <a:ln>
+            <a:ln>
+              <a:noFill/>
+            </a:ln>
+            <a:effectLst/>
+          </p:spPr>
+          <p:style>
+            <a:lnRef idx="1">
+              <a:schemeClr val="accent1"/>
+            </a:lnRef>
+            <a:fillRef idx="3">
+              <a:schemeClr val="accent1"/>
+            </a:fillRef>
+            <a:effectRef idx="2">
+              <a:schemeClr val="accent1"/>
+            </a:effectRef>
+            <a:fontRef idx="minor">
+              <a:schemeClr val="lt1"/>
+            </a:fontRef>
+          </p:style>
+          <p:txBody>
+            <a:bodyPr rtlCol="0" anchor="ctr"/>
+            <a:lstStyle/>
+            <a:p>
+              <a:pPr algn="ctr"/>
+              <a:endParaRPr lang="en-US"/>
+            </a:p>
+          </p:txBody>
+        </p:sp>
+        <p:cxnSp>
+          <p:nvCxnSpPr>
+            <p:cNvPr id="16" name="Straight Connector 15"/>
+            <p:cNvCxnSpPr/>
+            <p:nvPr/>
+          </p:nvCxnSpPr>
+          <p:spPr>
+            <a:xfrm>
+              <a:off x="4225815" y="1896434"/>
+              <a:ext cx="282236" cy="211694"/>
+            </a:xfrm>
+            <a:prstGeom prst="line">
+              <a:avLst/>
+            </a:prstGeom>
+            <a:ln w="38100" cmpd="sng">
+              <a:solidFill>
+                <a:schemeClr val="tx1"/>
+              </a:solidFill>
+            </a:ln>
+            <a:effectLst/>
+          </p:spPr>
+          <p:style>
+            <a:lnRef idx="2">
+              <a:schemeClr val="accent1"/>
+            </a:lnRef>
+            <a:fillRef idx="0">
+              <a:schemeClr val="accent1"/>
+            </a:fillRef>
+            <a:effectRef idx="1">
+              <a:schemeClr val="accent1"/>
+            </a:effectRef>
+            <a:fontRef idx="minor">
+              <a:schemeClr val="tx1"/>
+            </a:fontRef>
+          </p:style>
+        </p:cxnSp>
+        <p:sp>
+          <p:nvSpPr>
+            <p:cNvPr id="18" name="Oval 17"/>
+            <p:cNvSpPr/>
+            <p:nvPr/>
+          </p:nvSpPr>
+          <p:spPr>
+            <a:xfrm flipH="1">
+              <a:off x="4929380" y="2110589"/>
+              <a:ext cx="264596" cy="264596"/>
+            </a:xfrm>
+            <a:prstGeom prst="ellipse">
+              <a:avLst/>
+            </a:prstGeom>
             <a:solidFill>
               <a:schemeClr val="tx1"/>
             </a:solidFill>
-          </a:ln>
-          <a:effectLst/>
-        </p:spPr>
-        <p:style>
-          <a:lnRef idx="1">
-            <a:schemeClr val="accent1"/>
-          </a:lnRef>
-          <a:fillRef idx="3">
-            <a:schemeClr val="accent1"/>
-          </a:fillRef>
-          <a:effectRef idx="2">
-            <a:schemeClr val="accent1"/>
-          </a:effectRef>
-          <a:fontRef idx="minor">
-            <a:schemeClr val="lt1"/>
-          </a:fontRef>
-        </p:style>
-        <p:txBody>
-          <a:bodyPr rtlCol="0" anchor="ctr"/>
-          <a:lstStyle/>
-          <a:p>
-            <a:pPr algn="ctr"/>
-            <a:endParaRPr lang="en-US"/>
-          </a:p>
-        </p:txBody>
-      </p:sp>
-      <p:sp>
-        <p:nvSpPr>
-          <p:cNvPr id="6" name="Snip Same Side Corner Rectangle 5"/>
-          <p:cNvSpPr/>
-          <p:nvPr/>
-        </p:nvSpPr>
-        <p:spPr>
-          <a:xfrm>
-            <a:off x="3888637" y="1720001"/>
-            <a:ext cx="1641230" cy="1358369"/>
-          </a:xfrm>
-          <a:prstGeom prst="snip2SameRect">
-            <a:avLst/>
-          </a:prstGeom>
-          <a:solidFill>
-            <a:schemeClr val="bg1">
-              <a:lumMod val="95000"/>
-            </a:schemeClr>
-          </a:solidFill>
-          <a:ln>
-            <a:solidFill>
+            <a:ln>
+              <a:noFill/>
+            </a:ln>
+            <a:effectLst/>
+          </p:spPr>
+          <p:style>
+            <a:lnRef idx="1">
+              <a:schemeClr val="accent1"/>
+            </a:lnRef>
+            <a:fillRef idx="3">
+              <a:schemeClr val="accent1"/>
+            </a:fillRef>
+            <a:effectRef idx="2">
+              <a:schemeClr val="accent1"/>
+            </a:effectRef>
+            <a:fontRef idx="minor">
+              <a:schemeClr val="lt1"/>
+            </a:fontRef>
+          </p:style>
+          <p:txBody>
+            <a:bodyPr rtlCol="0" anchor="ctr"/>
+            <a:lstStyle/>
+            <a:p>
+              <a:pPr algn="ctr"/>
+              <a:endParaRPr lang="en-US"/>
+            </a:p>
+          </p:txBody>
+        </p:sp>
+        <p:cxnSp>
+          <p:nvCxnSpPr>
+            <p:cNvPr id="19" name="Straight Connector 18"/>
+            <p:cNvCxnSpPr/>
+            <p:nvPr/>
+          </p:nvCxnSpPr>
+          <p:spPr>
+            <a:xfrm flipH="1">
+              <a:off x="4929380" y="1898895"/>
+              <a:ext cx="282236" cy="211694"/>
+            </a:xfrm>
+            <a:prstGeom prst="line">
+              <a:avLst/>
+            </a:prstGeom>
+            <a:ln w="38100" cmpd="sng">
+              <a:solidFill>
+                <a:schemeClr val="tx1"/>
+              </a:solidFill>
+            </a:ln>
+            <a:effectLst/>
+          </p:spPr>
+          <p:style>
+            <a:lnRef idx="2">
+              <a:schemeClr val="accent1"/>
+            </a:lnRef>
+            <a:fillRef idx="0">
+              <a:schemeClr val="accent1"/>
+            </a:fillRef>
+            <a:effectRef idx="1">
+              <a:schemeClr val="accent1"/>
+            </a:effectRef>
+            <a:fontRef idx="minor">
               <a:schemeClr val="tx1"/>
-            </a:solidFill>
-          </a:ln>
-          <a:effectLst/>
-        </p:spPr>
-        <p:style>
-          <a:lnRef idx="1">
-            <a:schemeClr val="accent1"/>
-          </a:lnRef>
-          <a:fillRef idx="3">
-            <a:schemeClr val="accent1"/>
-          </a:fillRef>
-          <a:effectRef idx="2">
-            <a:schemeClr val="accent1"/>
-          </a:effectRef>
-          <a:fontRef idx="minor">
-            <a:schemeClr val="lt1"/>
-          </a:fontRef>
-        </p:style>
-        <p:txBody>
-          <a:bodyPr rtlCol="0" anchor="ctr"/>
-          <a:lstStyle/>
-          <a:p>
-            <a:pPr algn="ctr"/>
-            <a:endParaRPr lang="en-US"/>
-          </a:p>
-        </p:txBody>
-      </p:sp>
-      <p:sp>
-        <p:nvSpPr>
-          <p:cNvPr id="13" name="Freeform 12"/>
-          <p:cNvSpPr/>
-          <p:nvPr/>
-        </p:nvSpPr>
-        <p:spPr>
-          <a:xfrm>
-            <a:off x="4122001" y="2654249"/>
-            <a:ext cx="1160177" cy="282992"/>
-          </a:xfrm>
-          <a:custGeom>
-            <a:avLst/>
-            <a:gdLst>
-              <a:gd name="connsiteX0" fmla="*/ 0 w 2116768"/>
-              <a:gd name="connsiteY0" fmla="*/ 0 h 529266"/>
-              <a:gd name="connsiteX1" fmla="*/ 1076024 w 2116768"/>
-              <a:gd name="connsiteY1" fmla="*/ 529235 h 529266"/>
-              <a:gd name="connsiteX2" fmla="*/ 2116768 w 2116768"/>
-              <a:gd name="connsiteY2" fmla="*/ 17641 h 529266"/>
-            </a:gdLst>
-            <a:ahLst/>
-            <a:cxnLst>
-              <a:cxn ang="0">
-                <a:pos x="connsiteX0" y="connsiteY0"/>
-              </a:cxn>
-              <a:cxn ang="0">
-                <a:pos x="connsiteX1" y="connsiteY1"/>
-              </a:cxn>
-              <a:cxn ang="0">
-                <a:pos x="connsiteX2" y="connsiteY2"/>
-              </a:cxn>
-            </a:cxnLst>
-            <a:rect l="l" t="t" r="r" b="b"/>
-            <a:pathLst>
-              <a:path w="2116768" h="529266">
-                <a:moveTo>
-                  <a:pt x="0" y="0"/>
-                </a:moveTo>
-                <a:cubicBezTo>
-                  <a:pt x="361614" y="263147"/>
-                  <a:pt x="723229" y="526295"/>
-                  <a:pt x="1076024" y="529235"/>
-                </a:cubicBezTo>
-                <a:cubicBezTo>
-                  <a:pt x="1428819" y="532175"/>
-                  <a:pt x="1925671" y="332242"/>
-                  <a:pt x="2116768" y="17641"/>
-                </a:cubicBezTo>
-              </a:path>
-            </a:pathLst>
-          </a:custGeom>
-          <a:ln w="38100" cmpd="sng">
-            <a:solidFill>
-              <a:srgbClr val="000000"/>
-            </a:solidFill>
-          </a:ln>
-          <a:effectLst/>
-        </p:spPr>
-        <p:style>
-          <a:lnRef idx="2">
-            <a:schemeClr val="accent1"/>
-          </a:lnRef>
-          <a:fillRef idx="0">
-            <a:schemeClr val="accent1"/>
-          </a:fillRef>
-          <a:effectRef idx="1">
-            <a:schemeClr val="accent1"/>
-          </a:effectRef>
-          <a:fontRef idx="minor">
-            <a:schemeClr val="tx1"/>
-          </a:fontRef>
-        </p:style>
-        <p:txBody>
-          <a:bodyPr rtlCol="0" anchor="ctr"/>
-          <a:lstStyle/>
-          <a:p>
-            <a:pPr algn="ctr"/>
-            <a:endParaRPr lang="en-US"/>
-          </a:p>
-        </p:txBody>
-      </p:sp>
-      <p:sp>
-        <p:nvSpPr>
-          <p:cNvPr id="14" name="Oval 13"/>
-          <p:cNvSpPr/>
-          <p:nvPr/>
-        </p:nvSpPr>
-        <p:spPr>
-          <a:xfrm>
-            <a:off x="4225815" y="2108128"/>
-            <a:ext cx="264596" cy="264596"/>
-          </a:xfrm>
-          <a:prstGeom prst="ellipse">
-            <a:avLst/>
-          </a:prstGeom>
-          <a:solidFill>
-            <a:schemeClr val="tx1"/>
-          </a:solidFill>
-          <a:ln>
-            <a:noFill/>
-          </a:ln>
-          <a:effectLst/>
-        </p:spPr>
-        <p:style>
-          <a:lnRef idx="1">
-            <a:schemeClr val="accent1"/>
-          </a:lnRef>
-          <a:fillRef idx="3">
-            <a:schemeClr val="accent1"/>
-          </a:fillRef>
-          <a:effectRef idx="2">
-            <a:schemeClr val="accent1"/>
-          </a:effectRef>
-          <a:fontRef idx="minor">
-            <a:schemeClr val="lt1"/>
-          </a:fontRef>
-        </p:style>
-        <p:txBody>
-          <a:bodyPr rtlCol="0" anchor="ctr"/>
-          <a:lstStyle/>
-          <a:p>
-            <a:pPr algn="ctr"/>
-            <a:endParaRPr lang="en-US"/>
-          </a:p>
-        </p:txBody>
-      </p:sp>
-      <p:cxnSp>
-        <p:nvCxnSpPr>
-          <p:cNvPr id="16" name="Straight Connector 15"/>
-          <p:cNvCxnSpPr/>
-          <p:nvPr/>
-        </p:nvCxnSpPr>
-        <p:spPr>
-          <a:xfrm>
-            <a:off x="4225815" y="1896434"/>
-            <a:ext cx="282236" cy="211694"/>
-          </a:xfrm>
-          <a:prstGeom prst="line">
-            <a:avLst/>
-          </a:prstGeom>
-          <a:ln w="38100" cmpd="sng">
-            <a:solidFill>
-              <a:schemeClr val="tx1"/>
-            </a:solidFill>
-          </a:ln>
-          <a:effectLst/>
-        </p:spPr>
-        <p:style>
-          <a:lnRef idx="2">
-            <a:schemeClr val="accent1"/>
-          </a:lnRef>
-          <a:fillRef idx="0">
-            <a:schemeClr val="accent1"/>
-          </a:fillRef>
-          <a:effectRef idx="1">
-            <a:schemeClr val="accent1"/>
-          </a:effectRef>
-          <a:fontRef idx="minor">
-            <a:schemeClr val="tx1"/>
-          </a:fontRef>
-        </p:style>
-      </p:cxnSp>
-      <p:sp>
-        <p:nvSpPr>
-          <p:cNvPr id="18" name="Oval 17"/>
-          <p:cNvSpPr/>
-          <p:nvPr/>
-        </p:nvSpPr>
-        <p:spPr>
-          <a:xfrm flipH="1">
-            <a:off x="4929380" y="2110589"/>
-            <a:ext cx="264596" cy="264596"/>
-          </a:xfrm>
-          <a:prstGeom prst="ellipse">
-            <a:avLst/>
-          </a:prstGeom>
-          <a:solidFill>
-            <a:schemeClr val="tx1"/>
-          </a:solidFill>
-          <a:ln>
-            <a:noFill/>
-          </a:ln>
-          <a:effectLst/>
-        </p:spPr>
-        <p:style>
-          <a:lnRef idx="1">
-            <a:schemeClr val="accent1"/>
-          </a:lnRef>
-          <a:fillRef idx="3">
-            <a:schemeClr val="accent1"/>
-          </a:fillRef>
-          <a:effectRef idx="2">
-            <a:schemeClr val="accent1"/>
-          </a:effectRef>
-          <a:fontRef idx="minor">
-            <a:schemeClr val="lt1"/>
-          </a:fontRef>
-        </p:style>
-        <p:txBody>
-          <a:bodyPr rtlCol="0" anchor="ctr"/>
-          <a:lstStyle/>
-          <a:p>
-            <a:pPr algn="ctr"/>
-            <a:endParaRPr lang="en-US"/>
-          </a:p>
-        </p:txBody>
-      </p:sp>
-      <p:cxnSp>
-        <p:nvCxnSpPr>
-          <p:cNvPr id="19" name="Straight Connector 18"/>
-          <p:cNvCxnSpPr/>
-          <p:nvPr/>
-        </p:nvCxnSpPr>
-        <p:spPr>
-          <a:xfrm flipH="1">
-            <a:off x="4929380" y="1898895"/>
-            <a:ext cx="282236" cy="211694"/>
-          </a:xfrm>
-          <a:prstGeom prst="line">
-            <a:avLst/>
-          </a:prstGeom>
-          <a:ln w="38100" cmpd="sng">
-            <a:solidFill>
-              <a:schemeClr val="tx1"/>
-            </a:solidFill>
-          </a:ln>
-          <a:effectLst/>
-        </p:spPr>
-        <p:style>
-          <a:lnRef idx="2">
-            <a:schemeClr val="accent1"/>
-          </a:lnRef>
-          <a:fillRef idx="0">
-            <a:schemeClr val="accent1"/>
-          </a:fillRef>
-          <a:effectRef idx="1">
-            <a:schemeClr val="accent1"/>
-          </a:effectRef>
-          <a:fontRef idx="minor">
-            <a:schemeClr val="tx1"/>
-          </a:fontRef>
-        </p:style>
-      </p:cxnSp>
+            </a:fontRef>
+          </p:style>
+        </p:cxnSp>
+      </p:grpSp>
     </p:spTree>
     <p:extLst>
       <p:ext uri="{BB962C8B-B14F-4D97-AF65-F5344CB8AC3E}">
@@ -3700,6 +3716,548 @@
     <p:extLst>
       <p:ext uri="{BB962C8B-B14F-4D97-AF65-F5344CB8AC3E}">
         <p14:creationId xmlns:p14="http://schemas.microsoft.com/office/powerpoint/2010/main" val="1692483128"/>
+      </p:ext>
+    </p:extLst>
+  </p:cSld>
+  <p:clrMapOvr>
+    <a:masterClrMapping/>
+  </p:clrMapOvr>
+</p:sld>
+</file>
+
+<file path=ppt/slides/slide3.xml><?xml version="1.0" encoding="utf-8"?>
+<p:sld xmlns:a="http://schemas.openxmlformats.org/drawingml/2006/main" xmlns:r="http://schemas.openxmlformats.org/officeDocument/2006/relationships" xmlns:p="http://schemas.openxmlformats.org/presentationml/2006/main">
+  <p:cSld>
+    <p:spTree>
+      <p:nvGrpSpPr>
+        <p:cNvPr id="1" name=""/>
+        <p:cNvGrpSpPr/>
+        <p:nvPr/>
+      </p:nvGrpSpPr>
+      <p:grpSpPr>
+        <a:xfrm>
+          <a:off x="0" y="0"/>
+          <a:ext cx="0" cy="0"/>
+          <a:chOff x="0" y="0"/>
+          <a:chExt cx="0" cy="0"/>
+        </a:xfrm>
+      </p:grpSpPr>
+      <p:sp>
+        <p:nvSpPr>
+          <p:cNvPr id="5" name="Rectangle 4"/>
+          <p:cNvSpPr/>
+          <p:nvPr/>
+        </p:nvSpPr>
+        <p:spPr>
+          <a:xfrm>
+            <a:off x="352794" y="264617"/>
+            <a:ext cx="8537634" cy="6368458"/>
+          </a:xfrm>
+          <a:prstGeom prst="rect">
+            <a:avLst/>
+          </a:prstGeom>
+          <a:solidFill>
+            <a:schemeClr val="tx1"/>
+          </a:solidFill>
+          <a:ln>
+            <a:noFill/>
+          </a:ln>
+          <a:effectLst/>
+        </p:spPr>
+        <p:style>
+          <a:lnRef idx="1">
+            <a:schemeClr val="accent1"/>
+          </a:lnRef>
+          <a:fillRef idx="3">
+            <a:schemeClr val="accent1"/>
+          </a:fillRef>
+          <a:effectRef idx="2">
+            <a:schemeClr val="accent1"/>
+          </a:effectRef>
+          <a:fontRef idx="minor">
+            <a:schemeClr val="lt1"/>
+          </a:fontRef>
+        </p:style>
+        <p:txBody>
+          <a:bodyPr rtlCol="0" anchor="ctr"/>
+          <a:lstStyle/>
+          <a:p>
+            <a:pPr algn="ctr"/>
+            <a:endParaRPr lang="en-US"/>
+          </a:p>
+        </p:txBody>
+      </p:sp>
+      <p:grpSp>
+        <p:nvGrpSpPr>
+          <p:cNvPr id="6" name="Group 5"/>
+          <p:cNvGrpSpPr/>
+          <p:nvPr/>
+        </p:nvGrpSpPr>
+        <p:grpSpPr>
+          <a:xfrm>
+            <a:off x="3963245" y="398028"/>
+            <a:ext cx="1317454" cy="1103674"/>
+            <a:chOff x="2499145" y="1720001"/>
+            <a:chExt cx="4414341" cy="3698038"/>
+          </a:xfrm>
+        </p:grpSpPr>
+        <p:sp>
+          <p:nvSpPr>
+            <p:cNvPr id="7" name="Trapezoid 6"/>
+            <p:cNvSpPr/>
+            <p:nvPr/>
+          </p:nvSpPr>
+          <p:spPr>
+            <a:xfrm>
+              <a:off x="3888637" y="2857868"/>
+              <a:ext cx="1641230" cy="1584763"/>
+            </a:xfrm>
+            <a:prstGeom prst="trapezoid">
+              <a:avLst/>
+            </a:prstGeom>
+            <a:solidFill>
+              <a:schemeClr val="accent6">
+                <a:lumMod val="60000"/>
+                <a:lumOff val="40000"/>
+              </a:schemeClr>
+            </a:solidFill>
+            <a:ln>
+              <a:solidFill>
+                <a:schemeClr val="tx1"/>
+              </a:solidFill>
+            </a:ln>
+            <a:effectLst/>
+          </p:spPr>
+          <p:style>
+            <a:lnRef idx="1">
+              <a:schemeClr val="accent1"/>
+            </a:lnRef>
+            <a:fillRef idx="3">
+              <a:schemeClr val="accent1"/>
+            </a:fillRef>
+            <a:effectRef idx="2">
+              <a:schemeClr val="accent1"/>
+            </a:effectRef>
+            <a:fontRef idx="minor">
+              <a:schemeClr val="lt1"/>
+            </a:fontRef>
+          </p:style>
+          <p:txBody>
+            <a:bodyPr rtlCol="0" anchor="ctr"/>
+            <a:lstStyle/>
+            <a:p>
+              <a:pPr algn="ctr"/>
+              <a:endParaRPr lang="en-US"/>
+            </a:p>
+          </p:txBody>
+        </p:sp>
+        <p:sp>
+          <p:nvSpPr>
+            <p:cNvPr id="8" name="Hexagon 7"/>
+            <p:cNvSpPr/>
+            <p:nvPr/>
+          </p:nvSpPr>
+          <p:spPr>
+            <a:xfrm>
+              <a:off x="2499145" y="4314365"/>
+              <a:ext cx="4414341" cy="1103674"/>
+            </a:xfrm>
+            <a:prstGeom prst="hexagon">
+              <a:avLst/>
+            </a:prstGeom>
+            <a:solidFill>
+              <a:schemeClr val="accent2">
+                <a:lumMod val="60000"/>
+                <a:lumOff val="40000"/>
+              </a:schemeClr>
+            </a:solidFill>
+            <a:ln>
+              <a:solidFill>
+                <a:schemeClr val="tx1"/>
+              </a:solidFill>
+            </a:ln>
+            <a:effectLst/>
+          </p:spPr>
+          <p:style>
+            <a:lnRef idx="1">
+              <a:schemeClr val="accent1"/>
+            </a:lnRef>
+            <a:fillRef idx="3">
+              <a:schemeClr val="accent1"/>
+            </a:fillRef>
+            <a:effectRef idx="2">
+              <a:schemeClr val="accent1"/>
+            </a:effectRef>
+            <a:fontRef idx="minor">
+              <a:schemeClr val="lt1"/>
+            </a:fontRef>
+          </p:style>
+          <p:txBody>
+            <a:bodyPr rtlCol="0" anchor="ctr"/>
+            <a:lstStyle/>
+            <a:p>
+              <a:pPr algn="ctr"/>
+              <a:endParaRPr lang="en-US"/>
+            </a:p>
+          </p:txBody>
+        </p:sp>
+        <p:sp>
+          <p:nvSpPr>
+            <p:cNvPr id="9" name="Snip Same Side Corner Rectangle 8"/>
+            <p:cNvSpPr/>
+            <p:nvPr/>
+          </p:nvSpPr>
+          <p:spPr>
+            <a:xfrm>
+              <a:off x="3888637" y="1720001"/>
+              <a:ext cx="1641230" cy="1358369"/>
+            </a:xfrm>
+            <a:prstGeom prst="snip2SameRect">
+              <a:avLst/>
+            </a:prstGeom>
+            <a:solidFill>
+              <a:schemeClr val="bg1">
+                <a:lumMod val="95000"/>
+              </a:schemeClr>
+            </a:solidFill>
+            <a:ln>
+              <a:solidFill>
+                <a:schemeClr val="tx1"/>
+              </a:solidFill>
+            </a:ln>
+            <a:effectLst/>
+          </p:spPr>
+          <p:style>
+            <a:lnRef idx="1">
+              <a:schemeClr val="accent1"/>
+            </a:lnRef>
+            <a:fillRef idx="3">
+              <a:schemeClr val="accent1"/>
+            </a:fillRef>
+            <a:effectRef idx="2">
+              <a:schemeClr val="accent1"/>
+            </a:effectRef>
+            <a:fontRef idx="minor">
+              <a:schemeClr val="lt1"/>
+            </a:fontRef>
+          </p:style>
+          <p:txBody>
+            <a:bodyPr rtlCol="0" anchor="ctr"/>
+            <a:lstStyle/>
+            <a:p>
+              <a:pPr algn="ctr"/>
+              <a:endParaRPr lang="en-US"/>
+            </a:p>
+          </p:txBody>
+        </p:sp>
+        <p:sp>
+          <p:nvSpPr>
+            <p:cNvPr id="10" name="Freeform 9"/>
+            <p:cNvSpPr/>
+            <p:nvPr/>
+          </p:nvSpPr>
+          <p:spPr>
+            <a:xfrm>
+              <a:off x="4122001" y="2654249"/>
+              <a:ext cx="1160177" cy="282992"/>
+            </a:xfrm>
+            <a:custGeom>
+              <a:avLst/>
+              <a:gdLst>
+                <a:gd name="connsiteX0" fmla="*/ 0 w 2116768"/>
+                <a:gd name="connsiteY0" fmla="*/ 0 h 529266"/>
+                <a:gd name="connsiteX1" fmla="*/ 1076024 w 2116768"/>
+                <a:gd name="connsiteY1" fmla="*/ 529235 h 529266"/>
+                <a:gd name="connsiteX2" fmla="*/ 2116768 w 2116768"/>
+                <a:gd name="connsiteY2" fmla="*/ 17641 h 529266"/>
+              </a:gdLst>
+              <a:ahLst/>
+              <a:cxnLst>
+                <a:cxn ang="0">
+                  <a:pos x="connsiteX0" y="connsiteY0"/>
+                </a:cxn>
+                <a:cxn ang="0">
+                  <a:pos x="connsiteX1" y="connsiteY1"/>
+                </a:cxn>
+                <a:cxn ang="0">
+                  <a:pos x="connsiteX2" y="connsiteY2"/>
+                </a:cxn>
+              </a:cxnLst>
+              <a:rect l="l" t="t" r="r" b="b"/>
+              <a:pathLst>
+                <a:path w="2116768" h="529266">
+                  <a:moveTo>
+                    <a:pt x="0" y="0"/>
+                  </a:moveTo>
+                  <a:cubicBezTo>
+                    <a:pt x="361614" y="263147"/>
+                    <a:pt x="723229" y="526295"/>
+                    <a:pt x="1076024" y="529235"/>
+                  </a:cubicBezTo>
+                  <a:cubicBezTo>
+                    <a:pt x="1428819" y="532175"/>
+                    <a:pt x="1925671" y="332242"/>
+                    <a:pt x="2116768" y="17641"/>
+                  </a:cubicBezTo>
+                </a:path>
+              </a:pathLst>
+            </a:custGeom>
+            <a:ln w="38100" cmpd="sng">
+              <a:solidFill>
+                <a:srgbClr val="000000"/>
+              </a:solidFill>
+            </a:ln>
+            <a:effectLst/>
+          </p:spPr>
+          <p:style>
+            <a:lnRef idx="2">
+              <a:schemeClr val="accent1"/>
+            </a:lnRef>
+            <a:fillRef idx="0">
+              <a:schemeClr val="accent1"/>
+            </a:fillRef>
+            <a:effectRef idx="1">
+              <a:schemeClr val="accent1"/>
+            </a:effectRef>
+            <a:fontRef idx="minor">
+              <a:schemeClr val="tx1"/>
+            </a:fontRef>
+          </p:style>
+          <p:txBody>
+            <a:bodyPr rtlCol="0" anchor="ctr"/>
+            <a:lstStyle/>
+            <a:p>
+              <a:pPr algn="ctr"/>
+              <a:endParaRPr lang="en-US"/>
+            </a:p>
+          </p:txBody>
+        </p:sp>
+        <p:sp>
+          <p:nvSpPr>
+            <p:cNvPr id="11" name="Oval 10"/>
+            <p:cNvSpPr/>
+            <p:nvPr/>
+          </p:nvSpPr>
+          <p:spPr>
+            <a:xfrm>
+              <a:off x="4225815" y="2108128"/>
+              <a:ext cx="264596" cy="264596"/>
+            </a:xfrm>
+            <a:prstGeom prst="ellipse">
+              <a:avLst/>
+            </a:prstGeom>
+            <a:solidFill>
+              <a:schemeClr val="tx1"/>
+            </a:solidFill>
+            <a:ln>
+              <a:noFill/>
+            </a:ln>
+            <a:effectLst/>
+          </p:spPr>
+          <p:style>
+            <a:lnRef idx="1">
+              <a:schemeClr val="accent1"/>
+            </a:lnRef>
+            <a:fillRef idx="3">
+              <a:schemeClr val="accent1"/>
+            </a:fillRef>
+            <a:effectRef idx="2">
+              <a:schemeClr val="accent1"/>
+            </a:effectRef>
+            <a:fontRef idx="minor">
+              <a:schemeClr val="lt1"/>
+            </a:fontRef>
+          </p:style>
+          <p:txBody>
+            <a:bodyPr rtlCol="0" anchor="ctr"/>
+            <a:lstStyle/>
+            <a:p>
+              <a:pPr algn="ctr"/>
+              <a:endParaRPr lang="en-US"/>
+            </a:p>
+          </p:txBody>
+        </p:sp>
+        <p:cxnSp>
+          <p:nvCxnSpPr>
+            <p:cNvPr id="12" name="Straight Connector 11"/>
+            <p:cNvCxnSpPr/>
+            <p:nvPr/>
+          </p:nvCxnSpPr>
+          <p:spPr>
+            <a:xfrm>
+              <a:off x="4225815" y="1896434"/>
+              <a:ext cx="282236" cy="211694"/>
+            </a:xfrm>
+            <a:prstGeom prst="line">
+              <a:avLst/>
+            </a:prstGeom>
+            <a:ln w="38100" cmpd="sng">
+              <a:solidFill>
+                <a:schemeClr val="tx1"/>
+              </a:solidFill>
+            </a:ln>
+            <a:effectLst/>
+          </p:spPr>
+          <p:style>
+            <a:lnRef idx="2">
+              <a:schemeClr val="accent1"/>
+            </a:lnRef>
+            <a:fillRef idx="0">
+              <a:schemeClr val="accent1"/>
+            </a:fillRef>
+            <a:effectRef idx="1">
+              <a:schemeClr val="accent1"/>
+            </a:effectRef>
+            <a:fontRef idx="minor">
+              <a:schemeClr val="tx1"/>
+            </a:fontRef>
+          </p:style>
+        </p:cxnSp>
+        <p:sp>
+          <p:nvSpPr>
+            <p:cNvPr id="13" name="Oval 12"/>
+            <p:cNvSpPr/>
+            <p:nvPr/>
+          </p:nvSpPr>
+          <p:spPr>
+            <a:xfrm flipH="1">
+              <a:off x="4929380" y="2110589"/>
+              <a:ext cx="264596" cy="264596"/>
+            </a:xfrm>
+            <a:prstGeom prst="ellipse">
+              <a:avLst/>
+            </a:prstGeom>
+            <a:solidFill>
+              <a:schemeClr val="tx1"/>
+            </a:solidFill>
+            <a:ln>
+              <a:noFill/>
+            </a:ln>
+            <a:effectLst/>
+          </p:spPr>
+          <p:style>
+            <a:lnRef idx="1">
+              <a:schemeClr val="accent1"/>
+            </a:lnRef>
+            <a:fillRef idx="3">
+              <a:schemeClr val="accent1"/>
+            </a:fillRef>
+            <a:effectRef idx="2">
+              <a:schemeClr val="accent1"/>
+            </a:effectRef>
+            <a:fontRef idx="minor">
+              <a:schemeClr val="lt1"/>
+            </a:fontRef>
+          </p:style>
+          <p:txBody>
+            <a:bodyPr rtlCol="0" anchor="ctr"/>
+            <a:lstStyle/>
+            <a:p>
+              <a:pPr algn="ctr"/>
+              <a:endParaRPr lang="en-US"/>
+            </a:p>
+          </p:txBody>
+        </p:sp>
+        <p:cxnSp>
+          <p:nvCxnSpPr>
+            <p:cNvPr id="14" name="Straight Connector 13"/>
+            <p:cNvCxnSpPr/>
+            <p:nvPr/>
+          </p:nvCxnSpPr>
+          <p:spPr>
+            <a:xfrm flipH="1">
+              <a:off x="4929380" y="1898895"/>
+              <a:ext cx="282236" cy="211694"/>
+            </a:xfrm>
+            <a:prstGeom prst="line">
+              <a:avLst/>
+            </a:prstGeom>
+            <a:ln w="38100" cmpd="sng">
+              <a:solidFill>
+                <a:schemeClr val="tx1"/>
+              </a:solidFill>
+            </a:ln>
+            <a:effectLst/>
+          </p:spPr>
+          <p:style>
+            <a:lnRef idx="2">
+              <a:schemeClr val="accent1"/>
+            </a:lnRef>
+            <a:fillRef idx="0">
+              <a:schemeClr val="accent1"/>
+            </a:fillRef>
+            <a:effectRef idx="1">
+              <a:schemeClr val="accent1"/>
+            </a:effectRef>
+            <a:fontRef idx="minor">
+              <a:schemeClr val="tx1"/>
+            </a:fontRef>
+          </p:style>
+        </p:cxnSp>
+      </p:grpSp>
+      <p:sp>
+        <p:nvSpPr>
+          <p:cNvPr id="15" name="TextBox 14"/>
+          <p:cNvSpPr txBox="1"/>
+          <p:nvPr/>
+        </p:nvSpPr>
+        <p:spPr>
+          <a:xfrm>
+            <a:off x="1620518" y="4710189"/>
+            <a:ext cx="5874033" cy="954107"/>
+          </a:xfrm>
+          <a:prstGeom prst="rect">
+            <a:avLst/>
+          </a:prstGeom>
+          <a:noFill/>
+          <a:ln w="38100" cmpd="sng">
+            <a:solidFill>
+              <a:schemeClr val="bg1"/>
+            </a:solidFill>
+          </a:ln>
+        </p:spPr>
+        <p:txBody>
+          <a:bodyPr wrap="square" rtlCol="0">
+            <a:spAutoFit/>
+          </a:bodyPr>
+          <a:lstStyle/>
+          <a:p>
+            <a:r>
+              <a:rPr lang="en-US" sz="2800" dirty="0" smtClean="0">
+                <a:solidFill>
+                  <a:schemeClr val="bg1"/>
+                </a:solidFill>
+              </a:rPr>
+              <a:t>Evil </a:t>
+            </a:r>
+            <a:r>
+              <a:rPr lang="en-US" sz="2800" dirty="0" err="1" smtClean="0">
+                <a:solidFill>
+                  <a:schemeClr val="bg1"/>
+                </a:solidFill>
+              </a:rPr>
+              <a:t>Dr</a:t>
+            </a:r>
+            <a:r>
+              <a:rPr lang="en-US" sz="2800" dirty="0" smtClean="0">
+                <a:solidFill>
+                  <a:schemeClr val="bg1"/>
+                </a:solidFill>
+              </a:rPr>
+              <a:t> Darwin is planning to create the ultimate killing creature</a:t>
+            </a:r>
+            <a:endParaRPr lang="en-US" sz="2800" dirty="0">
+              <a:solidFill>
+                <a:schemeClr val="bg1"/>
+              </a:solidFill>
+            </a:endParaRPr>
+          </a:p>
+        </p:txBody>
+      </p:sp>
+    </p:spTree>
+    <p:extLst>
+      <p:ext uri="{BB962C8B-B14F-4D97-AF65-F5344CB8AC3E}">
+        <p14:creationId xmlns:p14="http://schemas.microsoft.com/office/powerpoint/2010/main" val="1344453308"/>
       </p:ext>
     </p:extLst>
   </p:cSld>

</xml_diff>